<commit_message>
week 5 - update links
</commit_message>
<xml_diff>
--- a/week_05/slides/rbp_workshop_05.pptx
+++ b/week_05/slides/rbp_workshop_05.pptx
@@ -35579,9 +35579,17 @@
                 </a:solidFill>
                 <a:latin typeface="Calibri" panose="020F0502020204030204" pitchFamily="34" charset="0"/>
                 <a:cs typeface="Calibri" panose="020F0502020204030204" pitchFamily="34" charset="0"/>
+                <a:hlinkClick r:id="rId3"/>
               </a:rPr>
-              <a:t>go to week 5</a:t>
+              <a:t>download week 5</a:t>
             </a:r>
+            <a:endParaRPr lang="en-CH" sz="2800" dirty="0">
+              <a:solidFill>
+                <a:schemeClr val="accent2"/>
+              </a:solidFill>
+              <a:latin typeface="Calibri" panose="020F0502020204030204" pitchFamily="34" charset="0"/>
+              <a:cs typeface="Calibri" panose="020F0502020204030204" pitchFamily="34" charset="0"/>
+            </a:endParaRPr>
           </a:p>
           <a:p>
             <a:pPr lvl="1"/>

</xml_diff>

<commit_message>
week 5 - mutate example
</commit_message>
<xml_diff>
--- a/week_05/slides/rbp_workshop_05.pptx
+++ b/week_05/slides/rbp_workshop_05.pptx
@@ -36673,6 +36673,105 @@
                       </p:childTnLst>
                     </p:cTn>
                   </p:par>
+                  <p:par>
+                    <p:cTn id="27" fill="hold">
+                      <p:stCondLst>
+                        <p:cond delay="indefinite"/>
+                      </p:stCondLst>
+                      <p:childTnLst>
+                        <p:par>
+                          <p:cTn id="28" fill="hold">
+                            <p:stCondLst>
+                              <p:cond delay="0"/>
+                            </p:stCondLst>
+                            <p:childTnLst>
+                              <p:par>
+                                <p:cTn id="29" presetID="1" presetClass="entr" presetSubtype="0" fill="hold" grpId="0" nodeType="clickEffect">
+                                  <p:stCondLst>
+                                    <p:cond delay="0"/>
+                                  </p:stCondLst>
+                                  <p:childTnLst>
+                                    <p:set>
+                                      <p:cBhvr>
+                                        <p:cTn id="30" dur="1" fill="hold">
+                                          <p:stCondLst>
+                                            <p:cond delay="0"/>
+                                          </p:stCondLst>
+                                        </p:cTn>
+                                        <p:tgtEl>
+                                          <p:spTgt spid="5"/>
+                                        </p:tgtEl>
+                                        <p:attrNameLst>
+                                          <p:attrName>style.visibility</p:attrName>
+                                        </p:attrNameLst>
+                                      </p:cBhvr>
+                                      <p:to>
+                                        <p:strVal val="visible"/>
+                                      </p:to>
+                                    </p:set>
+                                  </p:childTnLst>
+                                </p:cTn>
+                              </p:par>
+                              <p:par>
+                                <p:cTn id="31" presetID="1" presetClass="entr" presetSubtype="0" fill="hold" nodeType="withEffect">
+                                  <p:stCondLst>
+                                    <p:cond delay="0"/>
+                                  </p:stCondLst>
+                                  <p:childTnLst>
+                                    <p:set>
+                                      <p:cBhvr>
+                                        <p:cTn id="32" dur="1" fill="hold">
+                                          <p:stCondLst>
+                                            <p:cond delay="0"/>
+                                          </p:stCondLst>
+                                        </p:cTn>
+                                        <p:tgtEl>
+                                          <p:spTgt spid="7"/>
+                                        </p:tgtEl>
+                                        <p:attrNameLst>
+                                          <p:attrName>style.visibility</p:attrName>
+                                        </p:attrNameLst>
+                                      </p:cBhvr>
+                                      <p:to>
+                                        <p:strVal val="visible"/>
+                                      </p:to>
+                                    </p:set>
+                                  </p:childTnLst>
+                                </p:cTn>
+                              </p:par>
+                              <p:par>
+                                <p:cTn id="33" presetID="1" presetClass="entr" presetSubtype="0" fill="hold" nodeType="withEffect">
+                                  <p:stCondLst>
+                                    <p:cond delay="0"/>
+                                  </p:stCondLst>
+                                  <p:childTnLst>
+                                    <p:set>
+                                      <p:cBhvr>
+                                        <p:cTn id="34" dur="1" fill="hold">
+                                          <p:stCondLst>
+                                            <p:cond delay="0"/>
+                                          </p:stCondLst>
+                                        </p:cTn>
+                                        <p:tgtEl>
+                                          <p:spTgt spid="3"/>
+                                        </p:tgtEl>
+                                        <p:attrNameLst>
+                                          <p:attrName>style.visibility</p:attrName>
+                                        </p:attrNameLst>
+                                      </p:cBhvr>
+                                      <p:to>
+                                        <p:strVal val="visible"/>
+                                      </p:to>
+                                    </p:set>
+                                  </p:childTnLst>
+                                </p:cTn>
+                              </p:par>
+                            </p:childTnLst>
+                          </p:cTn>
+                        </p:par>
+                      </p:childTnLst>
+                    </p:cTn>
+                  </p:par>
                 </p:childTnLst>
               </p:cTn>
               <p:prevCondLst>
@@ -36696,6 +36795,7 @@
     </p:tnLst>
     <p:bldLst>
       <p:bldP spid="4" grpId="0" uiExpand="1" build="p"/>
+      <p:bldP spid="5" grpId="0" animBg="1"/>
     </p:bldLst>
   </p:timing>
 </p:sld>

</xml_diff>